<commit_message>
Install script instructions change
[git-p4: depot-paths = "//depot/main/embedded/Trima/Install/": change = 42080]
</commit_message>
<xml_diff>
--- a/Trima Install Scripts.pptx
+++ b/Trima Install Scripts.pptx
@@ -13,9 +13,10 @@
     <p:sldId id="261" r:id="rId7"/>
     <p:sldId id="267" r:id="rId8"/>
     <p:sldId id="266" r:id="rId9"/>
-    <p:sldId id="262" r:id="rId10"/>
-    <p:sldId id="263" r:id="rId11"/>
-    <p:sldId id="265" r:id="rId12"/>
+    <p:sldId id="268" r:id="rId10"/>
+    <p:sldId id="262" r:id="rId11"/>
+    <p:sldId id="263" r:id="rId12"/>
+    <p:sldId id="265" r:id="rId13"/>
   </p:sldIdLst>
   <p:sldSz cx="9144000" cy="6858000" type="screen4x3"/>
   <p:notesSz cx="6858000" cy="9144000"/>
@@ -299,7 +300,7 @@
             <a:fld id="{1D8BD707-D9CF-40AE-B4C6-C98DA3205C09}" type="datetimeFigureOut">
               <a:rPr lang="en-US" smtClean="0"/>
               <a:pPr/>
-              <a:t>3/7/2012</a:t>
+              <a:t>7/3/2012</a:t>
             </a:fld>
             <a:endParaRPr lang="en-US"/>
           </a:p>
@@ -466,7 +467,7 @@
             <a:fld id="{1D8BD707-D9CF-40AE-B4C6-C98DA3205C09}" type="datetimeFigureOut">
               <a:rPr lang="en-US" smtClean="0"/>
               <a:pPr/>
-              <a:t>3/7/2012</a:t>
+              <a:t>7/3/2012</a:t>
             </a:fld>
             <a:endParaRPr lang="en-US"/>
           </a:p>
@@ -643,7 +644,7 @@
             <a:fld id="{1D8BD707-D9CF-40AE-B4C6-C98DA3205C09}" type="datetimeFigureOut">
               <a:rPr lang="en-US" smtClean="0"/>
               <a:pPr/>
-              <a:t>3/7/2012</a:t>
+              <a:t>7/3/2012</a:t>
             </a:fld>
             <a:endParaRPr lang="en-US"/>
           </a:p>
@@ -810,7 +811,7 @@
             <a:fld id="{1D8BD707-D9CF-40AE-B4C6-C98DA3205C09}" type="datetimeFigureOut">
               <a:rPr lang="en-US" smtClean="0"/>
               <a:pPr/>
-              <a:t>3/7/2012</a:t>
+              <a:t>7/3/2012</a:t>
             </a:fld>
             <a:endParaRPr lang="en-US"/>
           </a:p>
@@ -1053,7 +1054,7 @@
             <a:fld id="{1D8BD707-D9CF-40AE-B4C6-C98DA3205C09}" type="datetimeFigureOut">
               <a:rPr lang="en-US" smtClean="0"/>
               <a:pPr/>
-              <a:t>3/7/2012</a:t>
+              <a:t>7/3/2012</a:t>
             </a:fld>
             <a:endParaRPr lang="en-US"/>
           </a:p>
@@ -1338,7 +1339,7 @@
             <a:fld id="{1D8BD707-D9CF-40AE-B4C6-C98DA3205C09}" type="datetimeFigureOut">
               <a:rPr lang="en-US" smtClean="0"/>
               <a:pPr/>
-              <a:t>3/7/2012</a:t>
+              <a:t>7/3/2012</a:t>
             </a:fld>
             <a:endParaRPr lang="en-US"/>
           </a:p>
@@ -1757,7 +1758,7 @@
             <a:fld id="{1D8BD707-D9CF-40AE-B4C6-C98DA3205C09}" type="datetimeFigureOut">
               <a:rPr lang="en-US" smtClean="0"/>
               <a:pPr/>
-              <a:t>3/7/2012</a:t>
+              <a:t>7/3/2012</a:t>
             </a:fld>
             <a:endParaRPr lang="en-US"/>
           </a:p>
@@ -1872,7 +1873,7 @@
             <a:fld id="{1D8BD707-D9CF-40AE-B4C6-C98DA3205C09}" type="datetimeFigureOut">
               <a:rPr lang="en-US" smtClean="0"/>
               <a:pPr/>
-              <a:t>3/7/2012</a:t>
+              <a:t>7/3/2012</a:t>
             </a:fld>
             <a:endParaRPr lang="en-US"/>
           </a:p>
@@ -1964,7 +1965,7 @@
             <a:fld id="{1D8BD707-D9CF-40AE-B4C6-C98DA3205C09}" type="datetimeFigureOut">
               <a:rPr lang="en-US" smtClean="0"/>
               <a:pPr/>
-              <a:t>3/7/2012</a:t>
+              <a:t>7/3/2012</a:t>
             </a:fld>
             <a:endParaRPr lang="en-US"/>
           </a:p>
@@ -2238,7 +2239,7 @@
             <a:fld id="{1D8BD707-D9CF-40AE-B4C6-C98DA3205C09}" type="datetimeFigureOut">
               <a:rPr lang="en-US" smtClean="0"/>
               <a:pPr/>
-              <a:t>3/7/2012</a:t>
+              <a:t>7/3/2012</a:t>
             </a:fld>
             <a:endParaRPr lang="en-US"/>
           </a:p>
@@ -2488,7 +2489,7 @@
             <a:fld id="{1D8BD707-D9CF-40AE-B4C6-C98DA3205C09}" type="datetimeFigureOut">
               <a:rPr lang="en-US" smtClean="0"/>
               <a:pPr/>
-              <a:t>3/7/2012</a:t>
+              <a:t>7/3/2012</a:t>
             </a:fld>
             <a:endParaRPr lang="en-US"/>
           </a:p>
@@ -2698,7 +2699,7 @@
             <a:fld id="{1D8BD707-D9CF-40AE-B4C6-C98DA3205C09}" type="datetimeFigureOut">
               <a:rPr lang="en-US" smtClean="0"/>
               <a:pPr/>
-              <a:t>3/7/2012</a:t>
+              <a:t>7/3/2012</a:t>
             </a:fld>
             <a:endParaRPr lang="en-US"/>
           </a:p>
@@ -3208,16 +3209,63 @@
         </p:nvSpPr>
         <p:spPr/>
         <p:txBody>
-          <a:bodyPr>
-            <a:normAutofit/>
-          </a:bodyPr>
+          <a:bodyPr/>
           <a:lstStyle/>
           <a:p>
             <a:pPr marL="514350" indent="-514350">
               <a:buFont typeface="+mj-lt"/>
-              <a:buAutoNum type="arabicPeriod" startAt="4"/>
+              <a:buAutoNum type="arabicPeriod" startAt="2"/>
             </a:pPr>
             <a:r>
+              <a:rPr lang="en-US" dirty="0" err="1" smtClean="0"/>
+              <a:t>updateTrimaBase.h</a:t>
+            </a:r>
+            <a:r>
+              <a:rPr lang="en-US" dirty="0" smtClean="0"/>
+              <a:t>:</a:t>
+            </a:r>
+          </a:p>
+          <a:p>
+            <a:pPr lvl="1"/>
+            <a:r>
+              <a:rPr lang="en-US" dirty="0" smtClean="0"/>
+              <a:t>Add the new version to </a:t>
+            </a:r>
+            <a:r>
+              <a:rPr lang="en-US" dirty="0" err="1" smtClean="0"/>
+              <a:t>TrimaVersion</a:t>
+            </a:r>
+            <a:r>
+              <a:rPr lang="en-US" dirty="0" smtClean="0"/>
+              <a:t> </a:t>
+            </a:r>
+            <a:r>
+              <a:rPr lang="en-US" dirty="0" err="1" smtClean="0"/>
+              <a:t>enum</a:t>
+            </a:r>
+            <a:r>
+              <a:rPr lang="en-US" dirty="0" smtClean="0"/>
+              <a:t> in </a:t>
+            </a:r>
+            <a:r>
+              <a:rPr lang="en-US" dirty="0" err="1" smtClean="0"/>
+              <a:t>updateTrimaBase.h</a:t>
+            </a:r>
+            <a:endParaRPr lang="en-US" dirty="0" smtClean="0"/>
+          </a:p>
+          <a:p>
+            <a:pPr lvl="1"/>
+            <a:r>
+              <a:rPr lang="en-US" dirty="0" smtClean="0"/>
+              <a:t>Add it before the NUMBER_OF_VERSIONS value</a:t>
+            </a:r>
+          </a:p>
+          <a:p>
+            <a:pPr marL="514350" indent="-514350">
+              <a:buFont typeface="+mj-lt"/>
+              <a:buAutoNum type="arabicPeriod" startAt="3"/>
+            </a:pPr>
+            <a:r>
               <a:rPr lang="en-US" dirty="0" smtClean="0"/>
               <a:t>UpdateTrima.cpp</a:t>
             </a:r>
@@ -3226,85 +3274,15 @@
             <a:pPr lvl="1"/>
             <a:r>
               <a:rPr lang="en-US" dirty="0" smtClean="0"/>
-              <a:t>In init():</a:t>
-            </a:r>
-          </a:p>
-          <a:p>
-            <a:pPr lvl="2"/>
-            <a:r>
-              <a:rPr lang="en-US" dirty="0" smtClean="0"/>
-              <a:t>Add a block to create an object of the new version (if needed) and a </a:t>
-            </a:r>
-            <a:r>
-              <a:rPr lang="en-US" dirty="0" err="1" smtClean="0"/>
-              <a:t>versionMap</a:t>
-            </a:r>
-            <a:r>
-              <a:rPr lang="en-US" dirty="0" smtClean="0"/>
-              <a:t> entry</a:t>
-            </a:r>
-          </a:p>
-          <a:p>
-            <a:pPr lvl="2"/>
-            <a:r>
-              <a:rPr lang="en-US" dirty="0" smtClean="0"/>
-              <a:t>Add an entry in the </a:t>
-            </a:r>
-            <a:r>
-              <a:rPr lang="en-US" dirty="0" err="1" smtClean="0"/>
-              <a:t>versionStringMap</a:t>
-            </a:r>
-            <a:r>
-              <a:rPr lang="en-US" dirty="0" smtClean="0"/>
-              <a:t> for that version – found under the </a:t>
-            </a:r>
-            <a:r>
-              <a:rPr lang="en-US" dirty="0" smtClean="0"/>
-              <a:t>comment: </a:t>
-            </a:r>
-          </a:p>
-          <a:p>
-            <a:pPr lvl="2">
-              <a:buNone/>
-            </a:pPr>
-            <a:r>
-              <a:rPr lang="en-US" dirty="0" smtClean="0">
-                <a:solidFill>
-                  <a:srgbClr val="FF0000"/>
-                </a:solidFill>
-              </a:rPr>
-              <a:t>// </a:t>
-            </a:r>
-            <a:r>
-              <a:rPr lang="en-US" dirty="0" smtClean="0">
-                <a:solidFill>
-                  <a:srgbClr val="FF0000"/>
-                </a:solidFill>
-              </a:rPr>
-              <a:t>Initialize the printable version strings</a:t>
-            </a:r>
-          </a:p>
-          <a:p>
-            <a:pPr lvl="1"/>
-            <a:r>
-              <a:rPr lang="en-US" dirty="0" smtClean="0"/>
-              <a:t>In </a:t>
-            </a:r>
-            <a:r>
-              <a:rPr lang="en-US" dirty="0" err="1" smtClean="0"/>
-              <a:t>parseRevision</a:t>
-            </a:r>
-            <a:r>
-              <a:rPr lang="en-US" dirty="0" smtClean="0"/>
-              <a:t>() modify the switch stmt to set the </a:t>
-            </a:r>
-            <a:r>
-              <a:rPr lang="en-US" dirty="0" err="1" smtClean="0"/>
-              <a:t>parsedVersion</a:t>
-            </a:r>
-            <a:r>
-              <a:rPr lang="en-US" dirty="0" smtClean="0"/>
-              <a:t> based on the new version’s build information</a:t>
+              <a:t>Add a true/false to the </a:t>
+            </a:r>
+            <a:r>
+              <a:rPr lang="en-US" dirty="0" err="1" smtClean="0"/>
+              <a:t>allowedPythonUpgrade</a:t>
+            </a:r>
+            <a:r>
+              <a:rPr lang="en-US" dirty="0" smtClean="0"/>
+              <a:t>[] array to indicate if that version can be installed on a Trima with a Python control computer</a:t>
             </a:r>
             <a:endParaRPr lang="en-US" dirty="0"/>
           </a:p>
@@ -3374,6 +3352,160 @@
         </p:nvSpPr>
         <p:spPr/>
         <p:txBody>
+          <a:bodyPr>
+            <a:normAutofit/>
+          </a:bodyPr>
+          <a:lstStyle/>
+          <a:p>
+            <a:pPr marL="514350" indent="-514350">
+              <a:buFont typeface="+mj-lt"/>
+              <a:buAutoNum type="arabicPeriod" startAt="4"/>
+            </a:pPr>
+            <a:r>
+              <a:rPr lang="en-US" dirty="0" smtClean="0"/>
+              <a:t>UpdateTrima.cpp</a:t>
+            </a:r>
+          </a:p>
+          <a:p>
+            <a:pPr lvl="1"/>
+            <a:r>
+              <a:rPr lang="en-US" dirty="0" smtClean="0"/>
+              <a:t>In init():</a:t>
+            </a:r>
+          </a:p>
+          <a:p>
+            <a:pPr lvl="2"/>
+            <a:r>
+              <a:rPr lang="en-US" dirty="0" smtClean="0"/>
+              <a:t>Add a block to create an object of the new version (if needed) and a </a:t>
+            </a:r>
+            <a:r>
+              <a:rPr lang="en-US" dirty="0" err="1" smtClean="0"/>
+              <a:t>versionMap</a:t>
+            </a:r>
+            <a:r>
+              <a:rPr lang="en-US" dirty="0" smtClean="0"/>
+              <a:t> entry</a:t>
+            </a:r>
+          </a:p>
+          <a:p>
+            <a:pPr lvl="2"/>
+            <a:r>
+              <a:rPr lang="en-US" dirty="0" smtClean="0"/>
+              <a:t>Add an entry in the </a:t>
+            </a:r>
+            <a:r>
+              <a:rPr lang="en-US" dirty="0" err="1" smtClean="0"/>
+              <a:t>versionStringMap</a:t>
+            </a:r>
+            <a:r>
+              <a:rPr lang="en-US" dirty="0" smtClean="0"/>
+              <a:t> for that version – found under the comment: </a:t>
+            </a:r>
+          </a:p>
+          <a:p>
+            <a:pPr lvl="2">
+              <a:buNone/>
+            </a:pPr>
+            <a:r>
+              <a:rPr lang="en-US" dirty="0" smtClean="0">
+                <a:solidFill>
+                  <a:srgbClr val="FF0000"/>
+                </a:solidFill>
+              </a:rPr>
+              <a:t>// Initialize the printable version strings</a:t>
+            </a:r>
+          </a:p>
+          <a:p>
+            <a:pPr lvl="1"/>
+            <a:r>
+              <a:rPr lang="en-US" dirty="0" smtClean="0"/>
+              <a:t>In </a:t>
+            </a:r>
+            <a:r>
+              <a:rPr lang="en-US" dirty="0" err="1" smtClean="0"/>
+              <a:t>parseRevision</a:t>
+            </a:r>
+            <a:r>
+              <a:rPr lang="en-US" dirty="0" smtClean="0"/>
+              <a:t>() modify the switch stmt to set the </a:t>
+            </a:r>
+            <a:r>
+              <a:rPr lang="en-US" dirty="0" err="1" smtClean="0"/>
+              <a:t>parsedVersion</a:t>
+            </a:r>
+            <a:r>
+              <a:rPr lang="en-US" dirty="0" smtClean="0"/>
+              <a:t> based on the new version’s build information</a:t>
+            </a:r>
+            <a:endParaRPr lang="en-US" dirty="0"/>
+          </a:p>
+        </p:txBody>
+      </p:sp>
+    </p:spTree>
+  </p:cSld>
+  <p:clrMapOvr>
+    <a:masterClrMapping/>
+  </p:clrMapOvr>
+</p:sld>
+</file>
+
+<file path=ppt/slides/slide12.xml><?xml version="1.0" encoding="utf-8"?>
+<p:sld xmlns:a="http://schemas.openxmlformats.org/drawingml/2006/main" xmlns:r="http://schemas.openxmlformats.org/officeDocument/2006/relationships" xmlns:p="http://schemas.openxmlformats.org/presentationml/2006/main">
+  <p:cSld>
+    <p:spTree>
+      <p:nvGrpSpPr>
+        <p:cNvPr id="1" name=""/>
+        <p:cNvGrpSpPr/>
+        <p:nvPr/>
+      </p:nvGrpSpPr>
+      <p:grpSpPr>
+        <a:xfrm>
+          <a:off x="0" y="0"/>
+          <a:ext cx="0" cy="0"/>
+          <a:chOff x="0" y="0"/>
+          <a:chExt cx="0" cy="0"/>
+        </a:xfrm>
+      </p:grpSpPr>
+      <p:sp>
+        <p:nvSpPr>
+          <p:cNvPr id="2" name="Title 1"/>
+          <p:cNvSpPr>
+            <a:spLocks noGrp="1"/>
+          </p:cNvSpPr>
+          <p:nvPr>
+            <p:ph type="title"/>
+          </p:nvPr>
+        </p:nvSpPr>
+        <p:spPr/>
+        <p:txBody>
+          <a:bodyPr/>
+          <a:lstStyle/>
+          <a:p>
+            <a:r>
+              <a:rPr lang="en-US" dirty="0" smtClean="0"/>
+              <a:t>Adding New Trima Version </a:t>
+            </a:r>
+            <a:r>
+              <a:rPr lang="en-US" dirty="0" err="1" smtClean="0"/>
+              <a:t>con’t</a:t>
+            </a:r>
+            <a:endParaRPr lang="en-US" dirty="0"/>
+          </a:p>
+        </p:txBody>
+      </p:sp>
+      <p:sp>
+        <p:nvSpPr>
+          <p:cNvPr id="3" name="Content Placeholder 2"/>
+          <p:cNvSpPr>
+            <a:spLocks noGrp="1"/>
+          </p:cNvSpPr>
+          <p:nvPr>
+            <p:ph idx="1"/>
+          </p:nvPr>
+        </p:nvSpPr>
+        <p:spPr/>
+        <p:txBody>
           <a:bodyPr/>
           <a:lstStyle/>
           <a:p>
@@ -4175,26 +4307,14 @@
             <a:pPr lvl="1"/>
             <a:r>
               <a:rPr lang="en-US" dirty="0" smtClean="0"/>
-              <a:t>What </a:t>
-            </a:r>
-            <a:r>
-              <a:rPr lang="en-US" dirty="0" smtClean="0"/>
-              <a:t>existing version the new one is derived from (its parent version</a:t>
-            </a:r>
-            <a:r>
-              <a:rPr lang="en-US" dirty="0" smtClean="0"/>
-              <a:t>).</a:t>
+              <a:t>What existing version the new one is derived from (its parent version).</a:t>
             </a:r>
           </a:p>
           <a:p>
             <a:pPr lvl="1"/>
             <a:r>
               <a:rPr lang="en-US" dirty="0" smtClean="0"/>
-              <a:t>If the new Trima SW version changes the config.dat from its parent version OR has any other version-specific </a:t>
-            </a:r>
-            <a:r>
-              <a:rPr lang="en-US" dirty="0" smtClean="0"/>
-              <a:t>changes.</a:t>
+              <a:t>If the new Trima SW version changes the config.dat from its parent version OR has any other version-specific changes.</a:t>
             </a:r>
           </a:p>
           <a:p>
@@ -4287,25 +4407,8 @@
             </a:pPr>
             <a:r>
               <a:rPr lang="en-US" dirty="0" smtClean="0"/>
-              <a:t>If </a:t>
-            </a:r>
-            <a:r>
-              <a:rPr lang="en-US" dirty="0" smtClean="0"/>
-              <a:t>it is functionally equivalent to </a:t>
-            </a:r>
-            <a:r>
-              <a:rPr lang="en-US" dirty="0" smtClean="0"/>
-              <a:t>its parent version</a:t>
-            </a:r>
-            <a:r>
-              <a:rPr lang="en-US" dirty="0" smtClean="0"/>
-              <a:t>, go to step </a:t>
-            </a:r>
-            <a:r>
-              <a:rPr lang="en-US" dirty="0" smtClean="0"/>
-              <a:t>2, otherwise:</a:t>
-            </a:r>
-            <a:endParaRPr lang="en-US" dirty="0" smtClean="0"/>
+              <a:t>If it is functionally equivalent to its parent version, go to step 2, otherwise:</a:t>
+            </a:r>
           </a:p>
           <a:p>
             <a:pPr marL="971550" lvl="1" indent="-514350">
@@ -4330,15 +4433,7 @@
             </a:r>
             <a:r>
               <a:rPr lang="en-US" dirty="0" smtClean="0"/>
-              <a:t> for that version using </a:t>
-            </a:r>
-            <a:r>
-              <a:rPr lang="en-US" dirty="0" smtClean="0"/>
-              <a:t>the nearest existing version </a:t>
-            </a:r>
-            <a:r>
-              <a:rPr lang="en-US" dirty="0" smtClean="0"/>
-              <a:t>as a model</a:t>
+              <a:t> for that version using the nearest existing version as a model</a:t>
             </a:r>
           </a:p>
           <a:p>
@@ -4437,79 +4532,39 @@
           <a:bodyPr/>
           <a:lstStyle/>
           <a:p>
-            <a:pPr marL="514350" indent="-514350">
+            <a:pPr marL="971550" lvl="1" indent="-514350">
               <a:buFont typeface="+mj-lt"/>
-              <a:buAutoNum type="arabicPeriod" startAt="2"/>
+              <a:buAutoNum type="alphaUcPeriod" startAt="3"/>
             </a:pPr>
             <a:r>
-              <a:rPr lang="en-US" dirty="0" err="1" smtClean="0"/>
-              <a:t>updateTrimaBase.h</a:t>
-            </a:r>
-            <a:r>
-              <a:rPr lang="en-US" dirty="0" smtClean="0"/>
-              <a:t>:</a:t>
-            </a:r>
-          </a:p>
-          <a:p>
-            <a:pPr lvl="1"/>
-            <a:r>
-              <a:rPr lang="en-US" dirty="0" smtClean="0"/>
-              <a:t>Add the new version to </a:t>
-            </a:r>
-            <a:r>
-              <a:rPr lang="en-US" dirty="0" err="1" smtClean="0"/>
-              <a:t>TrimaVersion</a:t>
-            </a:r>
-            <a:r>
-              <a:rPr lang="en-US" dirty="0" smtClean="0"/>
+              <a:rPr lang="en-US" dirty="0" smtClean="0"/>
+              <a:t>Add the new </a:t>
+            </a:r>
+            <a:r>
+              <a:rPr lang="en-US" dirty="0" err="1" smtClean="0"/>
+              <a:t>cpp</a:t>
+            </a:r>
+            <a:r>
+              <a:rPr lang="en-US" dirty="0" smtClean="0"/>
+              <a:t> file to the </a:t>
+            </a:r>
+            <a:r>
+              <a:rPr lang="en-US" dirty="0" err="1" smtClean="0"/>
+              <a:t>update_cxx_files</a:t>
+            </a:r>
+            <a:r>
+              <a:rPr lang="en-US" dirty="0" smtClean="0"/>
+              <a:t> define in the Install5X and Install6X </a:t>
+            </a:r>
+            <a:r>
+              <a:rPr lang="en-US" dirty="0" err="1" smtClean="0"/>
+              <a:t>makefiles</a:t>
+            </a:r>
+            <a:r>
+              <a:rPr lang="en-US" smtClean="0"/>
               <a:t> </a:t>
             </a:r>
-            <a:r>
-              <a:rPr lang="en-US" dirty="0" err="1" smtClean="0"/>
-              <a:t>enum</a:t>
-            </a:r>
-            <a:r>
-              <a:rPr lang="en-US" dirty="0" smtClean="0"/>
-              <a:t> in </a:t>
-            </a:r>
-            <a:r>
-              <a:rPr lang="en-US" dirty="0" err="1" smtClean="0"/>
-              <a:t>updateTrimaBase.h</a:t>
-            </a:r>
             <a:endParaRPr lang="en-US" dirty="0" smtClean="0"/>
-          </a:p>
-          <a:p>
-            <a:pPr lvl="1"/>
-            <a:r>
-              <a:rPr lang="en-US" dirty="0" smtClean="0"/>
-              <a:t>Add it before the NUMBER_OF_VERSIONS value</a:t>
-            </a:r>
-          </a:p>
-          <a:p>
-            <a:pPr marL="514350" indent="-514350">
-              <a:buFont typeface="+mj-lt"/>
-              <a:buAutoNum type="arabicPeriod" startAt="3"/>
-            </a:pPr>
-            <a:r>
-              <a:rPr lang="en-US" dirty="0" smtClean="0"/>
-              <a:t>UpdateTrima.cpp</a:t>
-            </a:r>
-          </a:p>
-          <a:p>
-            <a:pPr lvl="1"/>
-            <a:r>
-              <a:rPr lang="en-US" dirty="0" smtClean="0"/>
-              <a:t>Add a true/false to the </a:t>
-            </a:r>
-            <a:r>
-              <a:rPr lang="en-US" dirty="0" err="1" smtClean="0"/>
-              <a:t>allowedPythonUpgrade</a:t>
-            </a:r>
-            <a:r>
-              <a:rPr lang="en-US" dirty="0" smtClean="0"/>
-              <a:t>[] array to indicate if that version can be installed on a Trima with a Python control computer</a:t>
-            </a:r>
-            <a:endParaRPr lang="en-US" dirty="0"/>
           </a:p>
         </p:txBody>
       </p:sp>
@@ -4529,7 +4584,7 @@
         <a:sysClr val="windowText" lastClr="000000"/>
       </a:dk1>
       <a:lt1>
-        <a:sysClr val="window" lastClr="E6E6E6"/>
+        <a:sysClr val="window" lastClr="D2D2D2"/>
       </a:lt1>
       <a:dk2>
         <a:srgbClr val="1F497D"/>

</xml_diff>

<commit_message>
Updated for new Install architecture.
[git-p4: depot-paths = "//depot/main/embedded/Trima/Install/": change = 56884]
</commit_message>
<xml_diff>
--- a/Trima Install Scripts.pptx
+++ b/Trima Install Scripts.pptx
@@ -10,13 +10,10 @@
     <p:sldId id="257" r:id="rId4"/>
     <p:sldId id="259" r:id="rId5"/>
     <p:sldId id="260" r:id="rId6"/>
-    <p:sldId id="261" r:id="rId7"/>
-    <p:sldId id="267" r:id="rId8"/>
-    <p:sldId id="266" r:id="rId9"/>
-    <p:sldId id="268" r:id="rId10"/>
-    <p:sldId id="262" r:id="rId11"/>
-    <p:sldId id="263" r:id="rId12"/>
-    <p:sldId id="265" r:id="rId13"/>
+    <p:sldId id="270" r:id="rId7"/>
+    <p:sldId id="261" r:id="rId8"/>
+    <p:sldId id="267" r:id="rId9"/>
+    <p:sldId id="266" r:id="rId10"/>
   </p:sldIdLst>
   <p:sldSz cx="9144000" cy="6858000" type="screen4x3"/>
   <p:notesSz cx="6858000" cy="9144000"/>
@@ -300,7 +297,7 @@
             <a:fld id="{1D8BD707-D9CF-40AE-B4C6-C98DA3205C09}" type="datetimeFigureOut">
               <a:rPr lang="en-US" smtClean="0"/>
               <a:pPr/>
-              <a:t>7/3/2012</a:t>
+              <a:t>12/2/2013</a:t>
             </a:fld>
             <a:endParaRPr lang="en-US"/>
           </a:p>
@@ -467,7 +464,7 @@
             <a:fld id="{1D8BD707-D9CF-40AE-B4C6-C98DA3205C09}" type="datetimeFigureOut">
               <a:rPr lang="en-US" smtClean="0"/>
               <a:pPr/>
-              <a:t>7/3/2012</a:t>
+              <a:t>12/2/2013</a:t>
             </a:fld>
             <a:endParaRPr lang="en-US"/>
           </a:p>
@@ -644,7 +641,7 @@
             <a:fld id="{1D8BD707-D9CF-40AE-B4C6-C98DA3205C09}" type="datetimeFigureOut">
               <a:rPr lang="en-US" smtClean="0"/>
               <a:pPr/>
-              <a:t>7/3/2012</a:t>
+              <a:t>12/2/2013</a:t>
             </a:fld>
             <a:endParaRPr lang="en-US"/>
           </a:p>
@@ -811,7 +808,7 @@
             <a:fld id="{1D8BD707-D9CF-40AE-B4C6-C98DA3205C09}" type="datetimeFigureOut">
               <a:rPr lang="en-US" smtClean="0"/>
               <a:pPr/>
-              <a:t>7/3/2012</a:t>
+              <a:t>12/2/2013</a:t>
             </a:fld>
             <a:endParaRPr lang="en-US"/>
           </a:p>
@@ -1054,7 +1051,7 @@
             <a:fld id="{1D8BD707-D9CF-40AE-B4C6-C98DA3205C09}" type="datetimeFigureOut">
               <a:rPr lang="en-US" smtClean="0"/>
               <a:pPr/>
-              <a:t>7/3/2012</a:t>
+              <a:t>12/2/2013</a:t>
             </a:fld>
             <a:endParaRPr lang="en-US"/>
           </a:p>
@@ -1339,7 +1336,7 @@
             <a:fld id="{1D8BD707-D9CF-40AE-B4C6-C98DA3205C09}" type="datetimeFigureOut">
               <a:rPr lang="en-US" smtClean="0"/>
               <a:pPr/>
-              <a:t>7/3/2012</a:t>
+              <a:t>12/2/2013</a:t>
             </a:fld>
             <a:endParaRPr lang="en-US"/>
           </a:p>
@@ -1758,7 +1755,7 @@
             <a:fld id="{1D8BD707-D9CF-40AE-B4C6-C98DA3205C09}" type="datetimeFigureOut">
               <a:rPr lang="en-US" smtClean="0"/>
               <a:pPr/>
-              <a:t>7/3/2012</a:t>
+              <a:t>12/2/2013</a:t>
             </a:fld>
             <a:endParaRPr lang="en-US"/>
           </a:p>
@@ -1873,7 +1870,7 @@
             <a:fld id="{1D8BD707-D9CF-40AE-B4C6-C98DA3205C09}" type="datetimeFigureOut">
               <a:rPr lang="en-US" smtClean="0"/>
               <a:pPr/>
-              <a:t>7/3/2012</a:t>
+              <a:t>12/2/2013</a:t>
             </a:fld>
             <a:endParaRPr lang="en-US"/>
           </a:p>
@@ -1965,7 +1962,7 @@
             <a:fld id="{1D8BD707-D9CF-40AE-B4C6-C98DA3205C09}" type="datetimeFigureOut">
               <a:rPr lang="en-US" smtClean="0"/>
               <a:pPr/>
-              <a:t>7/3/2012</a:t>
+              <a:t>12/2/2013</a:t>
             </a:fld>
             <a:endParaRPr lang="en-US"/>
           </a:p>
@@ -2239,7 +2236,7 @@
             <a:fld id="{1D8BD707-D9CF-40AE-B4C6-C98DA3205C09}" type="datetimeFigureOut">
               <a:rPr lang="en-US" smtClean="0"/>
               <a:pPr/>
-              <a:t>7/3/2012</a:t>
+              <a:t>12/2/2013</a:t>
             </a:fld>
             <a:endParaRPr lang="en-US"/>
           </a:p>
@@ -2489,7 +2486,7 @@
             <a:fld id="{1D8BD707-D9CF-40AE-B4C6-C98DA3205C09}" type="datetimeFigureOut">
               <a:rPr lang="en-US" smtClean="0"/>
               <a:pPr/>
-              <a:t>7/3/2012</a:t>
+              <a:t>12/2/2013</a:t>
             </a:fld>
             <a:endParaRPr lang="en-US"/>
           </a:p>
@@ -2699,7 +2696,7 @@
             <a:fld id="{1D8BD707-D9CF-40AE-B4C6-C98DA3205C09}" type="datetimeFigureOut">
               <a:rPr lang="en-US" smtClean="0"/>
               <a:pPr/>
-              <a:t>7/3/2012</a:t>
+              <a:t>12/2/2013</a:t>
             </a:fld>
             <a:endParaRPr lang="en-US"/>
           </a:p>
@@ -3140,424 +3137,9 @@
             <a:pPr lvl="1"/>
             <a:r>
               <a:rPr lang="en-US" dirty="0" smtClean="0"/>
-              <a:t>Uses “base versions” (5.10 &amp; 6.00) as intermediate conversion steps</a:t>
-            </a:r>
-          </a:p>
-        </p:txBody>
-      </p:sp>
-    </p:spTree>
-  </p:cSld>
-  <p:clrMapOvr>
-    <a:masterClrMapping/>
-  </p:clrMapOvr>
-</p:sld>
-</file>
-
-<file path=ppt/slides/slide10.xml><?xml version="1.0" encoding="utf-8"?>
-<p:sld xmlns:a="http://schemas.openxmlformats.org/drawingml/2006/main" xmlns:r="http://schemas.openxmlformats.org/officeDocument/2006/relationships" xmlns:p="http://schemas.openxmlformats.org/presentationml/2006/main">
-  <p:cSld>
-    <p:spTree>
-      <p:nvGrpSpPr>
-        <p:cNvPr id="1" name=""/>
-        <p:cNvGrpSpPr/>
-        <p:nvPr/>
-      </p:nvGrpSpPr>
-      <p:grpSpPr>
-        <a:xfrm>
-          <a:off x="0" y="0"/>
-          <a:ext cx="0" cy="0"/>
-          <a:chOff x="0" y="0"/>
-          <a:chExt cx="0" cy="0"/>
-        </a:xfrm>
-      </p:grpSpPr>
-      <p:sp>
-        <p:nvSpPr>
-          <p:cNvPr id="2" name="Title 1"/>
-          <p:cNvSpPr>
-            <a:spLocks noGrp="1"/>
-          </p:cNvSpPr>
-          <p:nvPr>
-            <p:ph type="title"/>
-          </p:nvPr>
-        </p:nvSpPr>
-        <p:spPr/>
-        <p:txBody>
-          <a:bodyPr/>
-          <a:lstStyle/>
-          <a:p>
-            <a:r>
-              <a:rPr lang="en-US" dirty="0" smtClean="0"/>
-              <a:t>Adding New Trima Version </a:t>
-            </a:r>
-            <a:r>
-              <a:rPr lang="en-US" dirty="0" err="1" smtClean="0"/>
-              <a:t>con’t</a:t>
-            </a:r>
-            <a:endParaRPr lang="en-US" dirty="0"/>
-          </a:p>
-        </p:txBody>
-      </p:sp>
-      <p:sp>
-        <p:nvSpPr>
-          <p:cNvPr id="3" name="Content Placeholder 2"/>
-          <p:cNvSpPr>
-            <a:spLocks noGrp="1"/>
-          </p:cNvSpPr>
-          <p:nvPr>
-            <p:ph idx="1"/>
-          </p:nvPr>
-        </p:nvSpPr>
-        <p:spPr/>
-        <p:txBody>
-          <a:bodyPr/>
-          <a:lstStyle/>
-          <a:p>
-            <a:pPr marL="514350" indent="-514350">
-              <a:buFont typeface="+mj-lt"/>
-              <a:buAutoNum type="arabicPeriod" startAt="2"/>
-            </a:pPr>
-            <a:r>
-              <a:rPr lang="en-US" dirty="0" err="1" smtClean="0"/>
-              <a:t>updateTrimaBase.h</a:t>
-            </a:r>
-            <a:r>
-              <a:rPr lang="en-US" dirty="0" smtClean="0"/>
-              <a:t>:</a:t>
-            </a:r>
-          </a:p>
-          <a:p>
-            <a:pPr lvl="1"/>
-            <a:r>
-              <a:rPr lang="en-US" dirty="0" smtClean="0"/>
-              <a:t>Add the new version to </a:t>
-            </a:r>
-            <a:r>
-              <a:rPr lang="en-US" dirty="0" err="1" smtClean="0"/>
-              <a:t>TrimaVersion</a:t>
-            </a:r>
-            <a:r>
-              <a:rPr lang="en-US" dirty="0" smtClean="0"/>
-              <a:t> </a:t>
-            </a:r>
-            <a:r>
-              <a:rPr lang="en-US" dirty="0" err="1" smtClean="0"/>
-              <a:t>enum</a:t>
-            </a:r>
-            <a:r>
-              <a:rPr lang="en-US" dirty="0" smtClean="0"/>
-              <a:t> in </a:t>
-            </a:r>
-            <a:r>
-              <a:rPr lang="en-US" dirty="0" err="1" smtClean="0"/>
-              <a:t>updateTrimaBase.h</a:t>
+              <a:t>Checks ranges on config.dat items</a:t>
             </a:r>
             <a:endParaRPr lang="en-US" dirty="0" smtClean="0"/>
-          </a:p>
-          <a:p>
-            <a:pPr lvl="1"/>
-            <a:r>
-              <a:rPr lang="en-US" dirty="0" smtClean="0"/>
-              <a:t>Add it before the NUMBER_OF_VERSIONS value</a:t>
-            </a:r>
-          </a:p>
-          <a:p>
-            <a:pPr marL="514350" indent="-514350">
-              <a:buFont typeface="+mj-lt"/>
-              <a:buAutoNum type="arabicPeriod" startAt="3"/>
-            </a:pPr>
-            <a:r>
-              <a:rPr lang="en-US" dirty="0" smtClean="0"/>
-              <a:t>UpdateTrima.cpp</a:t>
-            </a:r>
-          </a:p>
-          <a:p>
-            <a:pPr lvl="1"/>
-            <a:r>
-              <a:rPr lang="en-US" dirty="0" smtClean="0"/>
-              <a:t>Add a true/false to the </a:t>
-            </a:r>
-            <a:r>
-              <a:rPr lang="en-US" dirty="0" err="1" smtClean="0"/>
-              <a:t>allowedPythonUpgrade</a:t>
-            </a:r>
-            <a:r>
-              <a:rPr lang="en-US" dirty="0" smtClean="0"/>
-              <a:t>[] array to indicate if that version can be installed on a Trima with a Python control computer</a:t>
-            </a:r>
-            <a:endParaRPr lang="en-US" dirty="0"/>
-          </a:p>
-        </p:txBody>
-      </p:sp>
-    </p:spTree>
-  </p:cSld>
-  <p:clrMapOvr>
-    <a:masterClrMapping/>
-  </p:clrMapOvr>
-</p:sld>
-</file>
-
-<file path=ppt/slides/slide11.xml><?xml version="1.0" encoding="utf-8"?>
-<p:sld xmlns:a="http://schemas.openxmlformats.org/drawingml/2006/main" xmlns:r="http://schemas.openxmlformats.org/officeDocument/2006/relationships" xmlns:p="http://schemas.openxmlformats.org/presentationml/2006/main">
-  <p:cSld>
-    <p:spTree>
-      <p:nvGrpSpPr>
-        <p:cNvPr id="1" name=""/>
-        <p:cNvGrpSpPr/>
-        <p:nvPr/>
-      </p:nvGrpSpPr>
-      <p:grpSpPr>
-        <a:xfrm>
-          <a:off x="0" y="0"/>
-          <a:ext cx="0" cy="0"/>
-          <a:chOff x="0" y="0"/>
-          <a:chExt cx="0" cy="0"/>
-        </a:xfrm>
-      </p:grpSpPr>
-      <p:sp>
-        <p:nvSpPr>
-          <p:cNvPr id="2" name="Title 1"/>
-          <p:cNvSpPr>
-            <a:spLocks noGrp="1"/>
-          </p:cNvSpPr>
-          <p:nvPr>
-            <p:ph type="title"/>
-          </p:nvPr>
-        </p:nvSpPr>
-        <p:spPr/>
-        <p:txBody>
-          <a:bodyPr/>
-          <a:lstStyle/>
-          <a:p>
-            <a:r>
-              <a:rPr lang="en-US" dirty="0" smtClean="0"/>
-              <a:t>Adding New Trima Version </a:t>
-            </a:r>
-            <a:r>
-              <a:rPr lang="en-US" dirty="0" err="1" smtClean="0"/>
-              <a:t>con’t</a:t>
-            </a:r>
-            <a:endParaRPr lang="en-US" dirty="0"/>
-          </a:p>
-        </p:txBody>
-      </p:sp>
-      <p:sp>
-        <p:nvSpPr>
-          <p:cNvPr id="3" name="Content Placeholder 2"/>
-          <p:cNvSpPr>
-            <a:spLocks noGrp="1"/>
-          </p:cNvSpPr>
-          <p:nvPr>
-            <p:ph idx="1"/>
-          </p:nvPr>
-        </p:nvSpPr>
-        <p:spPr/>
-        <p:txBody>
-          <a:bodyPr>
-            <a:normAutofit/>
-          </a:bodyPr>
-          <a:lstStyle/>
-          <a:p>
-            <a:pPr marL="514350" indent="-514350">
-              <a:buFont typeface="+mj-lt"/>
-              <a:buAutoNum type="arabicPeriod" startAt="4"/>
-            </a:pPr>
-            <a:r>
-              <a:rPr lang="en-US" dirty="0" smtClean="0"/>
-              <a:t>UpdateTrima.cpp</a:t>
-            </a:r>
-          </a:p>
-          <a:p>
-            <a:pPr lvl="1"/>
-            <a:r>
-              <a:rPr lang="en-US" dirty="0" smtClean="0"/>
-              <a:t>In init():</a:t>
-            </a:r>
-          </a:p>
-          <a:p>
-            <a:pPr lvl="2"/>
-            <a:r>
-              <a:rPr lang="en-US" dirty="0" smtClean="0"/>
-              <a:t>Add a block to create an object of the new version (if needed) and a </a:t>
-            </a:r>
-            <a:r>
-              <a:rPr lang="en-US" dirty="0" err="1" smtClean="0"/>
-              <a:t>versionMap</a:t>
-            </a:r>
-            <a:r>
-              <a:rPr lang="en-US" dirty="0" smtClean="0"/>
-              <a:t> entry</a:t>
-            </a:r>
-          </a:p>
-          <a:p>
-            <a:pPr lvl="2"/>
-            <a:r>
-              <a:rPr lang="en-US" dirty="0" smtClean="0"/>
-              <a:t>Add an entry in the </a:t>
-            </a:r>
-            <a:r>
-              <a:rPr lang="en-US" dirty="0" err="1" smtClean="0"/>
-              <a:t>versionStringMap</a:t>
-            </a:r>
-            <a:r>
-              <a:rPr lang="en-US" dirty="0" smtClean="0"/>
-              <a:t> for that version – found under the comment: </a:t>
-            </a:r>
-          </a:p>
-          <a:p>
-            <a:pPr lvl="2">
-              <a:buNone/>
-            </a:pPr>
-            <a:r>
-              <a:rPr lang="en-US" dirty="0" smtClean="0">
-                <a:solidFill>
-                  <a:srgbClr val="FF0000"/>
-                </a:solidFill>
-              </a:rPr>
-              <a:t>// Initialize the printable version strings</a:t>
-            </a:r>
-          </a:p>
-          <a:p>
-            <a:pPr lvl="1"/>
-            <a:r>
-              <a:rPr lang="en-US" dirty="0" smtClean="0"/>
-              <a:t>In </a:t>
-            </a:r>
-            <a:r>
-              <a:rPr lang="en-US" dirty="0" err="1" smtClean="0"/>
-              <a:t>parseRevision</a:t>
-            </a:r>
-            <a:r>
-              <a:rPr lang="en-US" dirty="0" smtClean="0"/>
-              <a:t>() modify the switch stmt to set the </a:t>
-            </a:r>
-            <a:r>
-              <a:rPr lang="en-US" dirty="0" err="1" smtClean="0"/>
-              <a:t>parsedVersion</a:t>
-            </a:r>
-            <a:r>
-              <a:rPr lang="en-US" dirty="0" smtClean="0"/>
-              <a:t> based on the new version’s build information</a:t>
-            </a:r>
-            <a:endParaRPr lang="en-US" dirty="0"/>
-          </a:p>
-        </p:txBody>
-      </p:sp>
-    </p:spTree>
-  </p:cSld>
-  <p:clrMapOvr>
-    <a:masterClrMapping/>
-  </p:clrMapOvr>
-</p:sld>
-</file>
-
-<file path=ppt/slides/slide12.xml><?xml version="1.0" encoding="utf-8"?>
-<p:sld xmlns:a="http://schemas.openxmlformats.org/drawingml/2006/main" xmlns:r="http://schemas.openxmlformats.org/officeDocument/2006/relationships" xmlns:p="http://schemas.openxmlformats.org/presentationml/2006/main">
-  <p:cSld>
-    <p:spTree>
-      <p:nvGrpSpPr>
-        <p:cNvPr id="1" name=""/>
-        <p:cNvGrpSpPr/>
-        <p:nvPr/>
-      </p:nvGrpSpPr>
-      <p:grpSpPr>
-        <a:xfrm>
-          <a:off x="0" y="0"/>
-          <a:ext cx="0" cy="0"/>
-          <a:chOff x="0" y="0"/>
-          <a:chExt cx="0" cy="0"/>
-        </a:xfrm>
-      </p:grpSpPr>
-      <p:sp>
-        <p:nvSpPr>
-          <p:cNvPr id="2" name="Title 1"/>
-          <p:cNvSpPr>
-            <a:spLocks noGrp="1"/>
-          </p:cNvSpPr>
-          <p:nvPr>
-            <p:ph type="title"/>
-          </p:nvPr>
-        </p:nvSpPr>
-        <p:spPr/>
-        <p:txBody>
-          <a:bodyPr/>
-          <a:lstStyle/>
-          <a:p>
-            <a:r>
-              <a:rPr lang="en-US" dirty="0" smtClean="0"/>
-              <a:t>Adding New Trima Version </a:t>
-            </a:r>
-            <a:r>
-              <a:rPr lang="en-US" dirty="0" err="1" smtClean="0"/>
-              <a:t>con’t</a:t>
-            </a:r>
-            <a:endParaRPr lang="en-US" dirty="0"/>
-          </a:p>
-        </p:txBody>
-      </p:sp>
-      <p:sp>
-        <p:nvSpPr>
-          <p:cNvPr id="3" name="Content Placeholder 2"/>
-          <p:cNvSpPr>
-            <a:spLocks noGrp="1"/>
-          </p:cNvSpPr>
-          <p:nvPr>
-            <p:ph idx="1"/>
-          </p:nvPr>
-        </p:nvSpPr>
-        <p:spPr/>
-        <p:txBody>
-          <a:bodyPr/>
-          <a:lstStyle/>
-          <a:p>
-            <a:pPr marL="514350" indent="-514350">
-              <a:buFont typeface="+mj-lt"/>
-              <a:buAutoNum type="arabicPeriod" startAt="5"/>
-            </a:pPr>
-            <a:r>
-              <a:rPr lang="en-US" dirty="0" smtClean="0"/>
-              <a:t>In all of the </a:t>
-            </a:r>
-            <a:r>
-              <a:rPr lang="en-US" dirty="0" err="1" smtClean="0"/>
-              <a:t>updateTrima</a:t>
-            </a:r>
-            <a:r>
-              <a:rPr lang="en-US" dirty="0" smtClean="0"/>
-              <a:t>###.</a:t>
-            </a:r>
-            <a:r>
-              <a:rPr lang="en-US" dirty="0" err="1" smtClean="0"/>
-              <a:t>cpp</a:t>
-            </a:r>
-            <a:r>
-              <a:rPr lang="en-US" dirty="0" smtClean="0"/>
-              <a:t> files</a:t>
-            </a:r>
-          </a:p>
-          <a:p>
-            <a:pPr lvl="1"/>
-            <a:r>
-              <a:rPr lang="en-US" dirty="0" smtClean="0"/>
-              <a:t>Add the new version to the switch statement to convert the config.dat correctly</a:t>
-            </a:r>
-          </a:p>
-          <a:p>
-            <a:pPr lvl="2"/>
-            <a:r>
-              <a:rPr lang="en-US" dirty="0" smtClean="0"/>
-              <a:t>This is the “from” version, so in the updateTrima610.cpp the “case V600:” is how to convert the 6.00 config.dat to the 6.10 format</a:t>
-            </a:r>
-          </a:p>
-          <a:p>
-            <a:pPr marL="514350" indent="-514350">
-              <a:buFont typeface="+mj-lt"/>
-              <a:buAutoNum type="arabicPeriod" startAt="6"/>
-            </a:pPr>
-            <a:r>
-              <a:rPr lang="en-US" dirty="0" smtClean="0"/>
-              <a:t>Compile and test.</a:t>
-            </a:r>
-            <a:endParaRPr lang="en-US" dirty="0"/>
           </a:p>
         </p:txBody>
       </p:sp>
@@ -3622,7 +3204,7 @@
         <p:spPr/>
         <p:txBody>
           <a:bodyPr>
-            <a:normAutofit/>
+            <a:normAutofit fontScale="92500" lnSpcReduction="10000"/>
           </a:bodyPr>
           <a:lstStyle/>
           <a:p>
@@ -3640,7 +3222,7 @@
             <a:pPr lvl="1"/>
             <a:r>
               <a:rPr lang="en-US" dirty="0" err="1" smtClean="0"/>
-              <a:t>updateTrima.h</a:t>
+              <a:t>installer.h</a:t>
             </a:r>
             <a:r>
               <a:rPr lang="en-US" dirty="0" smtClean="0"/>
@@ -3656,7 +3238,7 @@
             <a:pPr lvl="1"/>
             <a:r>
               <a:rPr lang="en-US" dirty="0" err="1" smtClean="0"/>
-              <a:t>updateTrimaBase.h</a:t>
+              <a:t>updatecassette.h</a:t>
             </a:r>
             <a:r>
               <a:rPr lang="en-US" dirty="0" smtClean="0"/>
@@ -3671,8 +3253,12 @@
           <a:p>
             <a:pPr lvl="1"/>
             <a:r>
-              <a:rPr lang="en-US" dirty="0" smtClean="0"/>
-              <a:t>updateTrima5X.h/</a:t>
+              <a:rPr lang="en-US" dirty="0" err="1" smtClean="0"/>
+              <a:t>updatecassette_dat.h</a:t>
+            </a:r>
+            <a:r>
+              <a:rPr lang="en-US" dirty="0" smtClean="0"/>
+              <a:t>/</a:t>
             </a:r>
             <a:r>
               <a:rPr lang="en-US" dirty="0" err="1" smtClean="0"/>
@@ -3683,8 +3269,12 @@
           <a:p>
             <a:pPr lvl="1"/>
             <a:r>
-              <a:rPr lang="en-US" dirty="0" smtClean="0"/>
-              <a:t>updateTrima6X.h/</a:t>
+              <a:rPr lang="en-US" dirty="0" err="1" smtClean="0"/>
+              <a:t>updateTrima.h</a:t>
+            </a:r>
+            <a:r>
+              <a:rPr lang="en-US" dirty="0" smtClean="0"/>
+              <a:t>/</a:t>
             </a:r>
             <a:r>
               <a:rPr lang="en-US" dirty="0" err="1" smtClean="0"/>
@@ -3696,37 +3286,43 @@
             <a:pPr lvl="1"/>
             <a:r>
               <a:rPr lang="en-US" dirty="0" err="1" smtClean="0"/>
-              <a:t>updateTrima</a:t>
-            </a:r>
-            <a:r>
-              <a:rPr lang="en-US" dirty="0" smtClean="0"/>
-              <a:t>###.h/</a:t>
+              <a:t>updateTrimaData.h</a:t>
+            </a:r>
+            <a:endParaRPr lang="en-US" sz="2000" dirty="0" smtClean="0"/>
+          </a:p>
+          <a:p>
+            <a:pPr lvl="1"/>
+            <a:r>
+              <a:rPr lang="en-US" dirty="0" err="1" smtClean="0"/>
+              <a:t>updateTrimaDefines.h</a:t>
+            </a:r>
+            <a:endParaRPr lang="en-US" sz="2000" dirty="0" smtClean="0"/>
+          </a:p>
+          <a:p>
+            <a:pPr lvl="1"/>
+            <a:r>
+              <a:rPr lang="en-US" dirty="0" err="1" smtClean="0"/>
+              <a:t>updateTrimaUtils.h</a:t>
+            </a:r>
+            <a:r>
+              <a:rPr lang="en-US" dirty="0" smtClean="0"/>
+              <a:t>/</a:t>
             </a:r>
             <a:r>
               <a:rPr lang="en-US" dirty="0" err="1" smtClean="0"/>
               <a:t>cpp</a:t>
             </a:r>
-            <a:r>
-              <a:rPr lang="en-US" dirty="0" smtClean="0"/>
-              <a:t> </a:t>
-            </a:r>
-            <a:r>
-              <a:rPr lang="en-US" sz="2000" dirty="0" smtClean="0"/>
-              <a:t>(### is version number)</a:t>
-            </a:r>
-          </a:p>
-          <a:p>
-            <a:pPr lvl="2"/>
-            <a:r>
-              <a:rPr lang="en-US" dirty="0" smtClean="0"/>
-              <a:t>One for every functionally equivalent version</a:t>
-            </a:r>
+            <a:endParaRPr lang="en-US" sz="2000" dirty="0" smtClean="0"/>
           </a:p>
           <a:p>
             <a:pPr lvl="1"/>
             <a:r>
               <a:rPr lang="en-US" dirty="0" smtClean="0"/>
-              <a:t>/Install5X and /Install6X are the build areas for </a:t>
+              <a:t>/</a:t>
+            </a:r>
+            <a:r>
+              <a:rPr lang="en-US" dirty="0" smtClean="0"/>
+              <a:t>Install5X and /Install6X are the build areas for </a:t>
             </a:r>
             <a:r>
               <a:rPr lang="en-US" dirty="0" err="1" smtClean="0"/>
@@ -3808,7 +3404,7 @@
         <p:spPr/>
         <p:txBody>
           <a:bodyPr>
-            <a:normAutofit fontScale="92500"/>
+            <a:normAutofit lnSpcReduction="10000"/>
           </a:bodyPr>
           <a:lstStyle/>
           <a:p>
@@ -3847,26 +3443,13 @@
           <a:p>
             <a:r>
               <a:rPr lang="en-US" dirty="0" smtClean="0"/>
-              <a:t>Calls update() for appropriate new version</a:t>
-            </a:r>
-          </a:p>
-          <a:p>
-            <a:r>
-              <a:rPr lang="en-US" dirty="0" smtClean="0"/>
-              <a:t>.</a:t>
-            </a:r>
-            <a:r>
-              <a:rPr lang="en-US" dirty="0" err="1" smtClean="0"/>
-              <a:t>cpp</a:t>
-            </a:r>
-            <a:r>
-              <a:rPr lang="en-US" dirty="0" smtClean="0"/>
-              <a:t> is modified for new versions of Trima SW</a:t>
-            </a:r>
-          </a:p>
-          <a:p>
-            <a:pPr lvl="1"/>
-            <a:endParaRPr lang="en-US" dirty="0"/>
+              <a:t>Calls </a:t>
+            </a:r>
+            <a:r>
+              <a:rPr lang="en-US" dirty="0" smtClean="0"/>
+              <a:t>installer::upgrade() with “from” and “to” version</a:t>
+            </a:r>
+            <a:endParaRPr lang="en-US" dirty="0" smtClean="0"/>
           </a:p>
         </p:txBody>
       </p:sp>
@@ -3912,7 +3495,7 @@
           <a:p>
             <a:r>
               <a:rPr lang="en-US" dirty="0" err="1" smtClean="0"/>
-              <a:t>updateTrimaBase.h</a:t>
+              <a:t>installer.h</a:t>
             </a:r>
             <a:r>
               <a:rPr lang="en-US" dirty="0" smtClean="0"/>
@@ -3939,7 +3522,7 @@
         <p:spPr/>
         <p:txBody>
           <a:bodyPr>
-            <a:normAutofit lnSpcReduction="10000"/>
+            <a:normAutofit/>
           </a:bodyPr>
           <a:lstStyle/>
           <a:p>
@@ -3958,63 +3541,28 @@
           </a:p>
           <a:p>
             <a:r>
+              <a:rPr lang="en-US" dirty="0" smtClean="0"/>
+              <a:t>Runs conversion functions based on the new </a:t>
+            </a:r>
+            <a:r>
               <a:rPr lang="en-US" dirty="0" err="1" smtClean="0"/>
-              <a:t>updateConfig</a:t>
-            </a:r>
-            <a:r>
-              <a:rPr lang="en-US" dirty="0" smtClean="0"/>
-              <a:t>…() functions convert config.dat from one version to closely related ones</a:t>
-            </a:r>
-          </a:p>
-          <a:p>
-            <a:pPr lvl="1"/>
-            <a:r>
-              <a:rPr lang="en-US" dirty="0" smtClean="0"/>
-              <a:t>Called by </a:t>
+              <a:t>Trima</a:t>
+            </a:r>
+            <a:r>
+              <a:rPr lang="en-US" dirty="0" smtClean="0"/>
+              <a:t> version and data in </a:t>
             </a:r>
             <a:r>
               <a:rPr lang="en-US" dirty="0" err="1" smtClean="0"/>
-              <a:t>updateConfigVersion</a:t>
-            </a:r>
-            <a:r>
-              <a:rPr lang="en-US" dirty="0" smtClean="0"/>
-              <a:t>() in </a:t>
-            </a:r>
-            <a:r>
-              <a:rPr lang="en-US" dirty="0" err="1" smtClean="0"/>
-              <a:t>updateTrima</a:t>
-            </a:r>
-            <a:r>
-              <a:rPr lang="en-US" dirty="0" smtClean="0"/>
-              <a:t>### classes</a:t>
-            </a:r>
-          </a:p>
-          <a:p>
-            <a:pPr lvl="1"/>
-            <a:r>
-              <a:rPr lang="en-US" dirty="0" smtClean="0"/>
-              <a:t>Used in series for longer conversions</a:t>
-            </a:r>
-          </a:p>
-          <a:p>
-            <a:r>
-              <a:rPr lang="en-US" dirty="0" smtClean="0"/>
-              <a:t>.h contains the version number </a:t>
-            </a:r>
-            <a:r>
-              <a:rPr lang="en-US" dirty="0" err="1" smtClean="0"/>
-              <a:t>enum</a:t>
+              <a:t>updatetrimadata.h</a:t>
             </a:r>
             <a:endParaRPr lang="en-US" dirty="0" smtClean="0"/>
           </a:p>
           <a:p>
-            <a:pPr lvl="1"/>
-            <a:r>
-              <a:rPr lang="en-US" dirty="0" smtClean="0"/>
-              <a:t>Gets updated for new versions of Trima SW</a:t>
-            </a:r>
-          </a:p>
-          <a:p>
+            <a:r>
+              <a:rPr lang="en-US" dirty="0" smtClean="0"/>
+              <a:t>For config.dat, it uses the new /templates/config.dat as a base and migrates user configured values to the new file</a:t>
+            </a:r>
             <a:endParaRPr lang="en-US" dirty="0"/>
           </a:p>
         </p:txBody>
@@ -4056,12 +3604,14 @@
         </p:nvSpPr>
         <p:spPr/>
         <p:txBody>
-          <a:bodyPr/>
-          <a:lstStyle/>
-          <a:p>
-            <a:r>
-              <a:rPr lang="en-US" dirty="0" smtClean="0"/>
-              <a:t>updateTrima5X &amp; update Trima6X</a:t>
+          <a:bodyPr>
+            <a:normAutofit/>
+          </a:bodyPr>
+          <a:lstStyle/>
+          <a:p>
+            <a:r>
+              <a:rPr lang="en-US" smtClean="0"/>
+              <a:t>updatetrimadata.h</a:t>
             </a:r>
             <a:endParaRPr lang="en-US" dirty="0"/>
           </a:p>
@@ -4079,31 +3629,86 @@
         </p:nvSpPr>
         <p:spPr/>
         <p:txBody>
-          <a:bodyPr/>
-          <a:lstStyle/>
-          <a:p>
-            <a:r>
-              <a:rPr lang="en-US" dirty="0" smtClean="0"/>
-              <a:t>Abstract classes for common 5.X (</a:t>
+          <a:bodyPr>
+            <a:normAutofit fontScale="92500" lnSpcReduction="10000"/>
+          </a:bodyPr>
+          <a:lstStyle/>
+          <a:p>
+            <a:r>
+              <a:rPr lang="en-US" dirty="0" smtClean="0"/>
+              <a:t>List of the supported </a:t>
             </a:r>
             <a:r>
               <a:rPr lang="en-US" dirty="0" err="1" smtClean="0"/>
-              <a:t>VxWorks</a:t>
-            </a:r>
-            <a:r>
-              <a:rPr lang="en-US" dirty="0" smtClean="0"/>
-              <a:t> 2.02) and 6.X (</a:t>
-            </a:r>
-            <a:r>
-              <a:rPr lang="en-US" dirty="0" err="1" smtClean="0"/>
-              <a:t>VxWorks</a:t>
-            </a:r>
-            <a:r>
-              <a:rPr lang="en-US" dirty="0" smtClean="0"/>
-              <a:t> 2.2) functionality</a:t>
-            </a:r>
-          </a:p>
-          <a:p>
+              <a:t>Trima</a:t>
+            </a:r>
+            <a:r>
+              <a:rPr lang="en-US" dirty="0" smtClean="0"/>
+              <a:t> builds and what conversion functions to run when installing them.</a:t>
+            </a:r>
+          </a:p>
+          <a:p>
+            <a:pPr lvl="1"/>
+            <a:r>
+              <a:rPr lang="en-US" dirty="0" smtClean="0"/>
+              <a:t>Install will use the data for </a:t>
+            </a:r>
+            <a:r>
+              <a:rPr lang="en-US" dirty="0" smtClean="0"/>
+              <a:t>the closest build with </a:t>
+            </a:r>
+            <a:r>
+              <a:rPr lang="en-US" dirty="0" smtClean="0"/>
+              <a:t>an equal or </a:t>
+            </a:r>
+            <a:r>
+              <a:rPr lang="en-US" dirty="0" smtClean="0"/>
+              <a:t>smaller build </a:t>
+            </a:r>
+            <a:r>
+              <a:rPr lang="en-US" dirty="0" smtClean="0"/>
+              <a:t>number.  </a:t>
+            </a:r>
+            <a:r>
+              <a:rPr lang="en-US" dirty="0" smtClean="0"/>
+              <a:t>(</a:t>
+            </a:r>
+            <a:r>
+              <a:rPr lang="en-US" dirty="0" smtClean="0"/>
+              <a:t>e.g. </a:t>
+            </a:r>
+            <a:r>
+              <a:rPr lang="en-US" dirty="0" smtClean="0"/>
+              <a:t>if build 6.327 is installed, the flags for 6.301 will be used</a:t>
+            </a:r>
+            <a:r>
+              <a:rPr lang="en-US" dirty="0" smtClean="0"/>
+              <a:t>)</a:t>
+            </a:r>
+          </a:p>
+          <a:p>
+            <a:pPr lvl="1"/>
+            <a:r>
+              <a:rPr lang="en-US" dirty="0" smtClean="0"/>
+              <a:t>It won’t jump down major or minor rev numbers (e.g. if build 9.0.020 is installed and the smallest 9.0. build number is 9.0.034, it won’t use the flags for 8.9.00001)</a:t>
+            </a:r>
+            <a:endParaRPr lang="en-US" dirty="0" smtClean="0"/>
+          </a:p>
+          <a:p>
+            <a:pPr lvl="1"/>
+            <a:r>
+              <a:rPr lang="en-US" dirty="0" smtClean="0"/>
+              <a:t>If Install can’t find an appropriate build, the build will fail</a:t>
+            </a:r>
+            <a:endParaRPr lang="en-US" dirty="0" smtClean="0"/>
+          </a:p>
+          <a:p>
+            <a:endParaRPr lang="en-US" dirty="0" smtClean="0"/>
+          </a:p>
+          <a:p>
+            <a:pPr>
+              <a:buNone/>
+            </a:pPr>
             <a:endParaRPr lang="en-US" dirty="0"/>
           </a:p>
         </p:txBody>
@@ -4145,20 +3750,22 @@
         </p:nvSpPr>
         <p:spPr/>
         <p:txBody>
-          <a:bodyPr/>
+          <a:bodyPr>
+            <a:normAutofit/>
+          </a:bodyPr>
           <a:lstStyle/>
           <a:p>
             <a:r>
               <a:rPr lang="en-US" dirty="0" err="1" smtClean="0"/>
-              <a:t>updateTrima</a:t>
-            </a:r>
-            <a:r>
-              <a:rPr lang="en-US" dirty="0" smtClean="0"/>
-              <a:t>###.h/</a:t>
+              <a:t>updatetrimadata.h</a:t>
+            </a:r>
+            <a:r>
+              <a:rPr lang="en-US" dirty="0" smtClean="0"/>
+              <a:t> </a:t>
             </a:r>
             <a:r>
               <a:rPr lang="en-US" dirty="0" err="1" smtClean="0"/>
-              <a:t>cpp</a:t>
+              <a:t>con’t</a:t>
             </a:r>
             <a:endParaRPr lang="en-US" dirty="0"/>
           </a:p>
@@ -4176,61 +3783,68 @@
         </p:nvSpPr>
         <p:spPr/>
         <p:txBody>
-          <a:bodyPr/>
-          <a:lstStyle/>
-          <a:p>
-            <a:r>
-              <a:rPr lang="en-US" dirty="0" smtClean="0"/>
-              <a:t>Contains version specific </a:t>
-            </a:r>
-            <a:r>
-              <a:rPr lang="en-US" smtClean="0"/>
-              <a:t>functions overridden </a:t>
-            </a:r>
-            <a:r>
-              <a:rPr lang="en-US" dirty="0" smtClean="0"/>
-              <a:t>from updateTrima5X/6X</a:t>
-            </a:r>
-          </a:p>
-          <a:p>
+          <a:bodyPr>
+            <a:normAutofit lnSpcReduction="10000"/>
+          </a:bodyPr>
+          <a:lstStyle/>
+          <a:p>
+            <a:r>
+              <a:rPr lang="en-US" dirty="0" smtClean="0"/>
+              <a:t>List of config.dat range values that are different across </a:t>
+            </a:r>
             <a:r>
               <a:rPr lang="en-US" dirty="0" err="1" smtClean="0"/>
-              <a:t>updateConfigVersion</a:t>
-            </a:r>
-            <a:r>
-              <a:rPr lang="en-US" dirty="0" smtClean="0"/>
-              <a:t>() specifies what </a:t>
+              <a:t>Trima</a:t>
+            </a:r>
+            <a:r>
+              <a:rPr lang="en-US" dirty="0" smtClean="0"/>
+              <a:t> versions for range checking.</a:t>
+            </a:r>
+          </a:p>
+          <a:p>
+            <a:pPr lvl="1"/>
+            <a:r>
+              <a:rPr lang="en-US" dirty="0" smtClean="0"/>
+              <a:t>Settings that have the same ranges across all versions aren't included because the </a:t>
             </a:r>
             <a:r>
               <a:rPr lang="en-US" dirty="0" err="1" smtClean="0"/>
-              <a:t>updateConfig</a:t>
-            </a:r>
-            <a:r>
-              <a:rPr lang="en-US" dirty="0" smtClean="0"/>
-              <a:t>…() functions in </a:t>
-            </a:r>
-            <a:r>
-              <a:rPr lang="en-US" dirty="0" err="1" smtClean="0"/>
-              <a:t>updateTrimaBase</a:t>
-            </a:r>
-            <a:r>
-              <a:rPr lang="en-US" dirty="0" smtClean="0"/>
-              <a:t> to call to correctly convert the config.dat files</a:t>
-            </a:r>
-          </a:p>
-          <a:p>
-            <a:r>
-              <a:rPr lang="en-US" dirty="0" smtClean="0"/>
-              <a:t>Have to update </a:t>
-            </a:r>
-            <a:r>
-              <a:rPr lang="en-US" dirty="0" err="1" smtClean="0"/>
-              <a:t>updateConfigVersion</a:t>
-            </a:r>
-            <a:r>
-              <a:rPr lang="en-US" dirty="0" smtClean="0"/>
-              <a:t>() for each new Trima version</a:t>
-            </a:r>
+              <a:t>Trima</a:t>
+            </a:r>
+            <a:r>
+              <a:rPr lang="en-US" dirty="0" smtClean="0"/>
+              <a:t> software </a:t>
+            </a:r>
+            <a:r>
+              <a:rPr lang="en-US" dirty="0" smtClean="0"/>
+              <a:t>will </a:t>
+            </a:r>
+            <a:r>
+              <a:rPr lang="en-US" dirty="0" smtClean="0"/>
+              <a:t>enforce ranges prior to installing a new version</a:t>
+            </a:r>
+            <a:r>
+              <a:rPr lang="en-US" dirty="0" smtClean="0"/>
+              <a:t>.</a:t>
+            </a:r>
+          </a:p>
+          <a:p>
+            <a:r>
+              <a:rPr lang="en-US" dirty="0" smtClean="0"/>
+              <a:t>Items in the PRODUCT_DEFINITIONS section will end in an underscore and all of the “a, b, c,..” products will be checked.</a:t>
+            </a:r>
+            <a:endParaRPr lang="en-US" dirty="0" smtClean="0"/>
+          </a:p>
+          <a:p>
+            <a:endParaRPr lang="en-US" dirty="0" smtClean="0"/>
+          </a:p>
+          <a:p>
+            <a:endParaRPr lang="en-US" dirty="0" smtClean="0"/>
+          </a:p>
+          <a:p>
+            <a:pPr>
+              <a:buNone/>
+            </a:pPr>
             <a:endParaRPr lang="en-US" dirty="0"/>
           </a:p>
         </p:txBody>
@@ -4277,7 +3891,7 @@
           <a:p>
             <a:r>
               <a:rPr lang="en-US" dirty="0" smtClean="0"/>
-              <a:t>Adding New Trima Version</a:t>
+              <a:t>Other files</a:t>
             </a:r>
             <a:endParaRPr lang="en-US" dirty="0"/>
           </a:p>
@@ -4295,42 +3909,108 @@
         </p:nvSpPr>
         <p:spPr/>
         <p:txBody>
-          <a:bodyPr/>
-          <a:lstStyle/>
-          <a:p>
-            <a:r>
-              <a:rPr lang="en-US" dirty="0" smtClean="0"/>
-              <a:t>Information to gather before starting:</a:t>
+          <a:bodyPr>
+            <a:normAutofit/>
+          </a:bodyPr>
+          <a:lstStyle/>
+          <a:p>
+            <a:r>
+              <a:rPr lang="en-US" dirty="0" err="1" smtClean="0"/>
+              <a:t>updatetrimaUtils.h</a:t>
+            </a:r>
+            <a:r>
+              <a:rPr lang="en-US" dirty="0" smtClean="0"/>
+              <a:t>/</a:t>
+            </a:r>
+            <a:r>
+              <a:rPr lang="en-US" dirty="0" err="1" smtClean="0"/>
+              <a:t>cpp</a:t>
+            </a:r>
+            <a:r>
+              <a:rPr lang="en-US" dirty="0" smtClean="0"/>
+              <a:t> </a:t>
             </a:r>
           </a:p>
           <a:p>
             <a:pPr lvl="1"/>
             <a:r>
               <a:rPr lang="en-US" dirty="0" smtClean="0"/>
-              <a:t>What existing version the new one is derived from (its parent version).</a:t>
-            </a:r>
+              <a:t>Utilities </a:t>
+            </a:r>
+            <a:r>
+              <a:rPr lang="en-US" dirty="0" smtClean="0"/>
+              <a:t>used by Install</a:t>
+            </a:r>
+          </a:p>
+          <a:p>
+            <a:r>
+              <a:rPr lang="en-US" dirty="0" err="1" smtClean="0"/>
+              <a:t>updatetrimaDefines.h</a:t>
+            </a:r>
+            <a:endParaRPr lang="en-US" dirty="0" smtClean="0"/>
           </a:p>
           <a:p>
             <a:pPr lvl="1"/>
             <a:r>
               <a:rPr lang="en-US" dirty="0" smtClean="0"/>
-              <a:t>If the new Trima SW version changes the config.dat from its parent version OR has any other version-specific changes.</a:t>
-            </a:r>
-          </a:p>
-          <a:p>
-            <a:pPr lvl="2"/>
-            <a:r>
-              <a:rPr lang="en-US" dirty="0" smtClean="0"/>
-              <a:t>If it doesn’t, it is “functionally equivalent” to its parent.</a:t>
+              <a:t>All of the #defines for Install</a:t>
+            </a:r>
+          </a:p>
+          <a:p>
+            <a:r>
+              <a:rPr lang="en-US" dirty="0" err="1" smtClean="0"/>
+              <a:t>updatecassette.h</a:t>
+            </a:r>
+            <a:r>
+              <a:rPr lang="en-US" dirty="0" smtClean="0"/>
+              <a:t>/</a:t>
+            </a:r>
+            <a:r>
+              <a:rPr lang="en-US" dirty="0" err="1" smtClean="0"/>
+              <a:t>cpp</a:t>
+            </a:r>
+            <a:r>
+              <a:rPr lang="en-US" dirty="0" smtClean="0"/>
+              <a:t> </a:t>
+            </a:r>
+            <a:r>
+              <a:rPr lang="en-US" dirty="0" smtClean="0"/>
+              <a:t>&amp; </a:t>
+            </a:r>
+            <a:r>
+              <a:rPr lang="en-US" dirty="0" err="1" smtClean="0"/>
+              <a:t>updatecassette_dat.h</a:t>
+            </a:r>
+            <a:r>
+              <a:rPr lang="en-US" dirty="0" smtClean="0"/>
+              <a:t>/</a:t>
+            </a:r>
+            <a:r>
+              <a:rPr lang="en-US" dirty="0" err="1" smtClean="0"/>
+              <a:t>cpp</a:t>
+            </a:r>
+            <a:r>
+              <a:rPr lang="en-US" dirty="0" smtClean="0"/>
+              <a:t> </a:t>
             </a:r>
           </a:p>
           <a:p>
             <a:pPr lvl="1"/>
             <a:r>
               <a:rPr lang="en-US" dirty="0" smtClean="0"/>
-              <a:t>How to distinguish it from other versions using the  build number.</a:t>
-            </a:r>
-            <a:endParaRPr lang="en-US" dirty="0"/>
+              <a:t>Cloned &amp; slightly modified versions of these </a:t>
+            </a:r>
+            <a:r>
+              <a:rPr lang="en-US" dirty="0" err="1" smtClean="0"/>
+              <a:t>Trima</a:t>
+            </a:r>
+            <a:r>
+              <a:rPr lang="en-US" dirty="0" smtClean="0"/>
+              <a:t> utilities</a:t>
+            </a:r>
+          </a:p>
+          <a:p>
+            <a:endParaRPr lang="en-US" dirty="0" smtClean="0"/>
           </a:p>
         </p:txBody>
       </p:sp>
@@ -4376,92 +4056,59 @@
           <a:p>
             <a:r>
               <a:rPr lang="en-US" dirty="0" smtClean="0"/>
-              <a:t>Adding New Trima Version </a:t>
+              <a:t>Adding New Trima Version</a:t>
+            </a:r>
+            <a:endParaRPr lang="en-US" dirty="0"/>
+          </a:p>
+        </p:txBody>
+      </p:sp>
+      <p:sp>
+        <p:nvSpPr>
+          <p:cNvPr id="3" name="Content Placeholder 2"/>
+          <p:cNvSpPr>
+            <a:spLocks noGrp="1"/>
+          </p:cNvSpPr>
+          <p:nvPr>
+            <p:ph idx="1"/>
+          </p:nvPr>
+        </p:nvSpPr>
+        <p:spPr/>
+        <p:txBody>
+          <a:bodyPr>
+            <a:normAutofit/>
+          </a:bodyPr>
+          <a:lstStyle/>
+          <a:p>
+            <a:r>
+              <a:rPr lang="en-US" dirty="0" smtClean="0"/>
+              <a:t>Unless there are major structural changes in the new </a:t>
             </a:r>
             <a:r>
               <a:rPr lang="en-US" dirty="0" err="1" smtClean="0"/>
-              <a:t>con’t</a:t>
-            </a:r>
-            <a:endParaRPr lang="en-US" dirty="0"/>
-          </a:p>
-        </p:txBody>
-      </p:sp>
-      <p:sp>
-        <p:nvSpPr>
-          <p:cNvPr id="3" name="Content Placeholder 2"/>
-          <p:cNvSpPr>
-            <a:spLocks noGrp="1"/>
-          </p:cNvSpPr>
-          <p:nvPr>
-            <p:ph idx="1"/>
-          </p:nvPr>
-        </p:nvSpPr>
-        <p:spPr/>
-        <p:txBody>
-          <a:bodyPr/>
-          <a:lstStyle/>
-          <a:p>
-            <a:pPr marL="514350" indent="-514350">
-              <a:buFont typeface="+mj-lt"/>
-              <a:buAutoNum type="arabicPeriod"/>
-            </a:pPr>
-            <a:r>
-              <a:rPr lang="en-US" dirty="0" smtClean="0"/>
-              <a:t>If it is functionally equivalent to its parent version, go to step 2, otherwise:</a:t>
-            </a:r>
-          </a:p>
-          <a:p>
-            <a:pPr marL="971550" lvl="1" indent="-514350">
-              <a:buFont typeface="+mj-lt"/>
-              <a:buAutoNum type="alphaUcPeriod"/>
-            </a:pPr>
-            <a:r>
-              <a:rPr lang="en-US" dirty="0" smtClean="0"/>
-              <a:t>Create a new </a:t>
+              <a:t>Trima</a:t>
+            </a:r>
+            <a:r>
+              <a:rPr lang="en-US" dirty="0" smtClean="0"/>
+              <a:t> version, adding new lines to </a:t>
             </a:r>
             <a:r>
               <a:rPr lang="en-US" dirty="0" err="1" smtClean="0"/>
-              <a:t>updateTrima</a:t>
-            </a:r>
-            <a:r>
-              <a:rPr lang="en-US" dirty="0" smtClean="0"/>
-              <a:t>###.h/</a:t>
-            </a:r>
-            <a:r>
-              <a:rPr lang="en-US" dirty="0" err="1" smtClean="0"/>
-              <a:t>cpp</a:t>
-            </a:r>
-            <a:r>
-              <a:rPr lang="en-US" dirty="0" smtClean="0"/>
-              <a:t> for that version using the nearest existing version as a model</a:t>
-            </a:r>
-          </a:p>
-          <a:p>
-            <a:pPr marL="971550" lvl="1" indent="-514350">
-              <a:buFont typeface="+mj-lt"/>
-              <a:buAutoNum type="alphaUcPeriod"/>
-            </a:pPr>
-            <a:r>
-              <a:rPr lang="en-US" dirty="0" smtClean="0"/>
-              <a:t>Add a </a:t>
-            </a:r>
-            <a:r>
-              <a:rPr lang="en-US" dirty="0" err="1" smtClean="0"/>
-              <a:t>updateConfigxxx</a:t>
-            </a:r>
-            <a:r>
-              <a:rPr lang="en-US" dirty="0" smtClean="0"/>
-              <a:t>() function to </a:t>
-            </a:r>
-            <a:r>
-              <a:rPr lang="en-US" dirty="0" err="1" smtClean="0"/>
-              <a:t>updateTrimaBase</a:t>
-            </a:r>
-            <a:r>
-              <a:rPr lang="en-US" dirty="0" smtClean="0"/>
-              <a:t> to convert the config.dat from the nearest version</a:t>
-            </a:r>
-            <a:endParaRPr lang="en-US" dirty="0"/>
+              <a:t>updatetrimadata.h</a:t>
+            </a:r>
+            <a:r>
+              <a:rPr lang="en-US" dirty="0" smtClean="0"/>
+              <a:t> is all that is needed.</a:t>
+            </a:r>
+          </a:p>
+          <a:p>
+            <a:r>
+              <a:rPr lang="en-US" dirty="0" smtClean="0"/>
+              <a:t>If the new version is just a build number increment of an existing version and the checks &amp; config.dat ranges are the same, nothing needs to be done. The data for the closest, smaller build will be used.</a:t>
+            </a:r>
+            <a:endParaRPr lang="en-US" dirty="0" smtClean="0"/>
+          </a:p>
+          <a:p>
+            <a:endParaRPr lang="en-US" dirty="0" smtClean="0"/>
           </a:p>
         </p:txBody>
       </p:sp>
@@ -4529,40 +4176,81 @@
         </p:nvSpPr>
         <p:spPr/>
         <p:txBody>
-          <a:bodyPr/>
-          <a:lstStyle/>
-          <a:p>
-            <a:pPr marL="971550" lvl="1" indent="-514350">
-              <a:buFont typeface="+mj-lt"/>
-              <a:buAutoNum type="alphaUcPeriod" startAt="3"/>
-            </a:pPr>
-            <a:r>
-              <a:rPr lang="en-US" dirty="0" smtClean="0"/>
-              <a:t>Add the new </a:t>
+          <a:bodyPr>
+            <a:normAutofit/>
+          </a:bodyPr>
+          <a:lstStyle/>
+          <a:p>
+            <a:pPr marL="514350" indent="-514350"/>
+            <a:r>
+              <a:rPr lang="en-US" dirty="0" smtClean="0"/>
+              <a:t>If </a:t>
+            </a:r>
+            <a:r>
+              <a:rPr lang="en-US" dirty="0" smtClean="0"/>
+              <a:t>conversion flags are different or there are config.dat range differences, a new entry in </a:t>
             </a:r>
             <a:r>
               <a:rPr lang="en-US" dirty="0" err="1" smtClean="0"/>
-              <a:t>cpp</a:t>
-            </a:r>
-            <a:r>
-              <a:rPr lang="en-US" dirty="0" smtClean="0"/>
-              <a:t> file to the </a:t>
+              <a:t>buildData</a:t>
+            </a:r>
+            <a:r>
+              <a:rPr lang="en-US" dirty="0" smtClean="0"/>
+              <a:t> will be needed.</a:t>
+            </a:r>
+          </a:p>
+          <a:p>
+            <a:pPr marL="514350" indent="-514350"/>
+            <a:r>
+              <a:rPr lang="en-US" dirty="0" smtClean="0"/>
+              <a:t>If there are config.dat range differences, new entries in </a:t>
             </a:r>
             <a:r>
               <a:rPr lang="en-US" dirty="0" err="1" smtClean="0"/>
-              <a:t>update_cxx_files</a:t>
-            </a:r>
-            <a:r>
-              <a:rPr lang="en-US" dirty="0" smtClean="0"/>
-              <a:t> define in the Install5X and Install6X </a:t>
+              <a:t>rangeData</a:t>
+            </a:r>
+            <a:r>
+              <a:rPr lang="en-US" dirty="0" smtClean="0"/>
+              <a:t> will be needed.</a:t>
+            </a:r>
+          </a:p>
+          <a:p>
+            <a:pPr marL="914400" lvl="1" indent="-514350"/>
+            <a:r>
+              <a:rPr lang="en-US" dirty="0" smtClean="0"/>
+              <a:t>The </a:t>
             </a:r>
             <a:r>
               <a:rPr lang="en-US" dirty="0" err="1" smtClean="0"/>
-              <a:t>makefiles</a:t>
-            </a:r>
-            <a:r>
-              <a:rPr lang="en-US" smtClean="0"/>
-              <a:t> </a:t>
+              <a:t>rangeType</a:t>
+            </a:r>
+            <a:r>
+              <a:rPr lang="en-US" dirty="0" smtClean="0"/>
+              <a:t> parameter in the </a:t>
+            </a:r>
+            <a:r>
+              <a:rPr lang="en-US" dirty="0" err="1" smtClean="0"/>
+              <a:t>buildData</a:t>
+            </a:r>
+            <a:r>
+              <a:rPr lang="en-US" dirty="0" smtClean="0"/>
+              <a:t> entry must correspond to a </a:t>
+            </a:r>
+            <a:r>
+              <a:rPr lang="en-US" dirty="0" err="1" smtClean="0"/>
+              <a:t>rangeType</a:t>
+            </a:r>
+            <a:r>
+              <a:rPr lang="en-US" dirty="0" smtClean="0"/>
+              <a:t> in the </a:t>
+            </a:r>
+            <a:r>
+              <a:rPr lang="en-US" dirty="0" err="1" smtClean="0"/>
+              <a:t>rangeData</a:t>
+            </a:r>
+            <a:r>
+              <a:rPr lang="en-US" dirty="0" smtClean="0"/>
+              <a:t> list.</a:t>
             </a:r>
             <a:endParaRPr lang="en-US" dirty="0" smtClean="0"/>
           </a:p>
@@ -4584,7 +4272,7 @@
         <a:sysClr val="windowText" lastClr="000000"/>
       </a:dk1>
       <a:lt1>
-        <a:sysClr val="window" lastClr="D2D2D2"/>
+        <a:sysClr val="window" lastClr="FFFFFF"/>
       </a:lt1>
       <a:dk2>
         <a:srgbClr val="1F497D"/>

</xml_diff>